<commit_message>
final commit after correcting merged code, and adding cards
</commit_message>
<xml_diff>
--- a/Group_Project_1_vStarter_template.pptx
+++ b/Group_Project_1_vStarter_template.pptx
@@ -725,8 +725,8 @@
         </p:nvSpPr>
         <p:spPr>
           <a:xfrm>
-            <a:off x="381300" y="685800"/>
-            <a:ext cx="6096075" cy="3429000"/>
+            <a:off x="381000" y="685800"/>
+            <a:ext cx="6096000" cy="3429000"/>
           </a:xfrm>
           <a:custGeom>
             <a:avLst/>
@@ -829,7 +829,7 @@
         </p:nvSpPr>
         <p:spPr>
           <a:xfrm>
-            <a:off x="381300" y="685800"/>
+            <a:off x="381000" y="685800"/>
             <a:ext cx="6096000" cy="3429000"/>
           </a:xfrm>
           <a:custGeom>
@@ -933,7 +933,7 @@
         </p:nvSpPr>
         <p:spPr>
           <a:xfrm>
-            <a:off x="381300" y="685800"/>
+            <a:off x="381000" y="685800"/>
             <a:ext cx="6096000" cy="3429000"/>
           </a:xfrm>
           <a:custGeom>
@@ -1037,7 +1037,7 @@
         </p:nvSpPr>
         <p:spPr>
           <a:xfrm>
-            <a:off x="381300" y="685800"/>
+            <a:off x="381000" y="685800"/>
             <a:ext cx="6096000" cy="3429000"/>
           </a:xfrm>
           <a:custGeom>
@@ -6225,10 +6225,10 @@
               <a:buNone/>
             </a:pPr>
             <a:r>
-              <a:rPr lang="en"/>
-              <a:t>Project Title</a:t>
+              <a:rPr lang="en" dirty="0"/>
+              <a:t>Movie Actor Finder Project</a:t>
             </a:r>
-            <a:endParaRPr/>
+            <a:endParaRPr dirty="0"/>
           </a:p>
         </p:txBody>
       </p:sp>
@@ -6267,29 +6267,10 @@
               <a:buNone/>
             </a:pPr>
             <a:r>
-              <a:rPr lang="en">
-                <a:solidFill>
-                  <a:srgbClr val="FFFFFF"/>
-                </a:solidFill>
-                <a:highlight>
-                  <a:srgbClr val="FF0000"/>
-                </a:highlight>
-              </a:rPr>
-              <a:t>MAKE A COPY!</a:t>
+              <a:rPr lang="en-US" dirty="0"/>
+              <a:t>Helps you find where to watch your favorite actor</a:t>
             </a:r>
-            <a:r>
-              <a:rPr lang="en">
-                <a:highlight>
-                  <a:srgbClr val="FFFF00"/>
-                </a:highlight>
-              </a:rPr>
-              <a:t> DO NOT REQUEST EDIT ACCESS</a:t>
-            </a:r>
-            <a:endParaRPr>
-              <a:highlight>
-                <a:srgbClr val="FFFF00"/>
-              </a:highlight>
-            </a:endParaRPr>
+            <a:endParaRPr dirty="0"/>
           </a:p>
         </p:txBody>
       </p:sp>
@@ -6330,7 +6311,7 @@
         </p:nvSpPr>
         <p:spPr>
           <a:xfrm>
-            <a:off x="311700" y="2150850"/>
+            <a:off x="239129" y="380107"/>
             <a:ext cx="8520600" cy="841800"/>
           </a:xfrm>
           <a:prstGeom prst="rect">
@@ -6353,10 +6334,45 @@
               <a:buNone/>
             </a:pPr>
             <a:r>
-              <a:rPr lang="en"/>
-              <a:t>Elevator pitch</a:t>
+              <a:rPr lang="en" dirty="0"/>
+              <a:t>Movie Actor Finder - Elevator pitch</a:t>
             </a:r>
-            <a:endParaRPr/>
+            <a:endParaRPr dirty="0"/>
+          </a:p>
+        </p:txBody>
+      </p:sp>
+      <p:sp>
+        <p:nvSpPr>
+          <p:cNvPr id="2" name="TextBox 1">
+            <a:extLst>
+              <a:ext uri="{FF2B5EF4-FFF2-40B4-BE49-F238E27FC236}">
+                <a16:creationId xmlns:a16="http://schemas.microsoft.com/office/drawing/2014/main" id="{69AE32E9-1FC0-48A5-A536-FCCCB53E9177}"/>
+              </a:ext>
+            </a:extLst>
+          </p:cNvPr>
+          <p:cNvSpPr txBox="1"/>
+          <p:nvPr/>
+        </p:nvSpPr>
+        <p:spPr>
+          <a:xfrm>
+            <a:off x="732971" y="1524000"/>
+            <a:ext cx="7605486" cy="954107"/>
+          </a:xfrm>
+          <a:prstGeom prst="rect">
+            <a:avLst/>
+          </a:prstGeom>
+          <a:noFill/>
+        </p:spPr>
+        <p:txBody>
+          <a:bodyPr wrap="square" rtlCol="0">
+            <a:spAutoFit/>
+          </a:bodyPr>
+          <a:lstStyle/>
+          <a:p>
+            <a:r>
+              <a:rPr lang="en-US" dirty="0"/>
+              <a:t>Do you have a favorite movie actor?  Would you like to easily learn how to watch your favorite actor in your favorite movies? The Movie Actor Finder application allows you to search for movies by an actor’s name and not only see a list of the movies the actor is in but also get information on what platforms those movies are being shown right now.</a:t>
+            </a:r>
           </a:p>
         </p:txBody>
       </p:sp>
@@ -6463,10 +6479,10 @@
               <a:buChar char="●"/>
             </a:pPr>
             <a:r>
-              <a:rPr lang="en"/>
-              <a:t>Description</a:t>
+              <a:rPr lang="en" dirty="0"/>
+              <a:t>Description – an application to locate movie venue/platforms for a particular actor</a:t>
             </a:r>
-            <a:endParaRPr/>
+            <a:endParaRPr dirty="0"/>
           </a:p>
           <a:p>
             <a:pPr marL="457200" lvl="0" indent="-342900" algn="l" rtl="0">
@@ -6480,10 +6496,10 @@
               <a:buChar char="●"/>
             </a:pPr>
             <a:r>
-              <a:rPr lang="en"/>
-              <a:t>Motivation for development?</a:t>
+              <a:rPr lang="en" dirty="0"/>
+              <a:t>Motivation for development – we like movies but sometimes with all of the different movie platforms (Netflix, HBO, iTunes, Amazon, etc.) it is hard to know where to find movies that your favorite actor is in</a:t>
             </a:r>
-            <a:endParaRPr/>
+            <a:endParaRPr dirty="0"/>
           </a:p>
           <a:p>
             <a:pPr marL="457200" lvl="0" indent="-342900" algn="l" rtl="0">
@@ -6497,10 +6513,10 @@
               <a:buChar char="●"/>
             </a:pPr>
             <a:r>
-              <a:rPr lang="en"/>
-              <a:t>User story</a:t>
+              <a:rPr lang="en" dirty="0"/>
+              <a:t>User story – As a movie watcher, I want to be able to search for movies by actors names and see a list of movies that actor is in and also see on what venues I can watch those movies today</a:t>
             </a:r>
-            <a:endParaRPr/>
+            <a:endParaRPr dirty="0"/>
           </a:p>
         </p:txBody>
       </p:sp>
@@ -6541,7 +6557,7 @@
         </p:nvSpPr>
         <p:spPr>
           <a:xfrm>
-            <a:off x="311700" y="445025"/>
+            <a:off x="260900" y="96682"/>
             <a:ext cx="8520600" cy="572700"/>
           </a:xfrm>
           <a:prstGeom prst="rect">
@@ -6564,10 +6580,10 @@
               <a:buNone/>
             </a:pPr>
             <a:r>
-              <a:rPr lang="en"/>
+              <a:rPr lang="en" dirty="0"/>
               <a:t>Process</a:t>
             </a:r>
-            <a:endParaRPr/>
+            <a:endParaRPr dirty="0"/>
           </a:p>
         </p:txBody>
       </p:sp>
@@ -6583,8 +6599,8 @@
         </p:nvSpPr>
         <p:spPr>
           <a:xfrm>
-            <a:off x="311700" y="1152475"/>
-            <a:ext cx="8520600" cy="3416400"/>
+            <a:off x="311700" y="669382"/>
+            <a:ext cx="8520600" cy="3899493"/>
           </a:xfrm>
           <a:prstGeom prst="rect">
             <a:avLst/>
@@ -6607,61 +6623,208 @@
               <a:buChar char="●"/>
             </a:pPr>
             <a:r>
-              <a:rPr lang="en"/>
+              <a:rPr lang="en" sz="1400" dirty="0"/>
               <a:t>Technologies used</a:t>
             </a:r>
-            <a:endParaRPr/>
           </a:p>
           <a:p>
-            <a:pPr marL="457200" lvl="0" indent="-342900" algn="l" rtl="0">
-              <a:spcBef>
-                <a:spcPts val="0"/>
-              </a:spcBef>
-              <a:spcAft>
-                <a:spcPts val="0"/>
-              </a:spcAft>
+            <a:pPr lvl="1" indent="-342900">
+              <a:spcBef>
+                <a:spcPts val="0"/>
+              </a:spcBef>
               <a:buSzPts val="1800"/>
               <a:buChar char="●"/>
             </a:pPr>
             <a:r>
-              <a:rPr lang="en"/>
-              <a:t>Breakdown of tasks and roles</a:t>
+              <a:rPr lang="en" sz="1100" dirty="0"/>
+              <a:t>CSS – Bulma</a:t>
             </a:r>
-            <a:endParaRPr/>
           </a:p>
           <a:p>
-            <a:pPr marL="457200" lvl="0" indent="-342900" algn="l" rtl="0">
-              <a:spcBef>
-                <a:spcPts val="0"/>
-              </a:spcBef>
-              <a:spcAft>
-                <a:spcPts val="0"/>
-              </a:spcAft>
+            <a:pPr lvl="1" indent="-342900">
+              <a:spcBef>
+                <a:spcPts val="0"/>
+              </a:spcBef>
               <a:buSzPts val="1800"/>
               <a:buChar char="●"/>
             </a:pPr>
             <a:r>
-              <a:rPr lang="en"/>
-              <a:t>Challenges</a:t>
+              <a:rPr lang="en" sz="1100" dirty="0"/>
+              <a:t>APIs:</a:t>
             </a:r>
-            <a:endParaRPr/>
           </a:p>
           <a:p>
-            <a:pPr marL="457200" lvl="0" indent="-342900" algn="l" rtl="0">
-              <a:spcBef>
-                <a:spcPts val="0"/>
-              </a:spcBef>
-              <a:spcAft>
-                <a:spcPts val="0"/>
-              </a:spcAft>
+            <a:pPr lvl="2" indent="-342900">
+              <a:spcBef>
+                <a:spcPts val="0"/>
+              </a:spcBef>
               <a:buSzPts val="1800"/>
               <a:buChar char="●"/>
             </a:pPr>
             <a:r>
-              <a:rPr lang="en"/>
-              <a:t>Successes</a:t>
+              <a:rPr lang="en" sz="1100" dirty="0"/>
+              <a:t>Data-IMBD1 – to get actor id</a:t>
             </a:r>
-            <a:endParaRPr/>
+          </a:p>
+          <a:p>
+            <a:pPr lvl="2" indent="-342900">
+              <a:spcBef>
+                <a:spcPts val="0"/>
+              </a:spcBef>
+              <a:buSzPts val="1800"/>
+              <a:buChar char="●"/>
+            </a:pPr>
+            <a:r>
+              <a:rPr lang="en" sz="1100" dirty="0"/>
+              <a:t>Data-IMBD1 – to get movie titles</a:t>
+            </a:r>
+          </a:p>
+          <a:p>
+            <a:pPr lvl="2" indent="-342900">
+              <a:spcBef>
+                <a:spcPts val="0"/>
+              </a:spcBef>
+              <a:buSzPts val="1800"/>
+              <a:buChar char="●"/>
+            </a:pPr>
+            <a:r>
+              <a:rPr lang="en" sz="1100" dirty="0"/>
+              <a:t>Utelly-TV-Shows-and-Movies – to get current venues for each movie</a:t>
+            </a:r>
+          </a:p>
+          <a:p>
+            <a:pPr lvl="2" indent="-342900">
+              <a:spcBef>
+                <a:spcPts val="0"/>
+              </a:spcBef>
+              <a:buSzPts val="1800"/>
+              <a:buChar char="●"/>
+            </a:pPr>
+            <a:endParaRPr sz="1100" dirty="0"/>
+          </a:p>
+          <a:p>
+            <a:pPr marL="457200" lvl="0" indent="-342900" algn="l" rtl="0">
+              <a:spcBef>
+                <a:spcPts val="0"/>
+              </a:spcBef>
+              <a:spcAft>
+                <a:spcPts val="0"/>
+              </a:spcAft>
+              <a:buSzPts val="1800"/>
+              <a:buChar char="●"/>
+            </a:pPr>
+            <a:r>
+              <a:rPr lang="en" sz="1400" dirty="0"/>
+              <a:t>Breakdown of tasks and roles</a:t>
+            </a:r>
+          </a:p>
+          <a:p>
+            <a:pPr lvl="1" indent="-342900">
+              <a:spcBef>
+                <a:spcPts val="0"/>
+              </a:spcBef>
+              <a:buSzPts val="1800"/>
+              <a:buChar char="●"/>
+            </a:pPr>
+            <a:r>
+              <a:rPr lang="en" sz="1100" dirty="0"/>
+              <a:t>Sam – responsible for page formatting</a:t>
+            </a:r>
+          </a:p>
+          <a:p>
+            <a:pPr lvl="1" indent="-342900">
+              <a:spcBef>
+                <a:spcPts val="0"/>
+              </a:spcBef>
+              <a:buSzPts val="1800"/>
+              <a:buChar char="●"/>
+            </a:pPr>
+            <a:r>
+              <a:rPr lang="en" sz="1100" dirty="0"/>
+              <a:t>Taylor – responsible for search bar code, callable modal, when scrapped due to API problems, helped complete JS code to present data from APIs, helped with initial page structure</a:t>
+            </a:r>
+          </a:p>
+          <a:p>
+            <a:pPr lvl="1" indent="-342900">
+              <a:spcBef>
+                <a:spcPts val="0"/>
+              </a:spcBef>
+              <a:buSzPts val="1800"/>
+              <a:buChar char="●"/>
+            </a:pPr>
+            <a:r>
+              <a:rPr lang="en" sz="1100" dirty="0"/>
+              <a:t>Brad – responsible for APIs and PowerPoint presentation</a:t>
+            </a:r>
+          </a:p>
+          <a:p>
+            <a:pPr lvl="1" indent="-342900">
+              <a:spcBef>
+                <a:spcPts val="0"/>
+              </a:spcBef>
+              <a:buSzPts val="1800"/>
+              <a:buChar char="●"/>
+            </a:pPr>
+            <a:r>
+              <a:rPr lang="en" sz="1100" dirty="0"/>
+              <a:t>Joey – responsible for initial page structure</a:t>
+            </a:r>
+          </a:p>
+          <a:p>
+            <a:pPr lvl="1" indent="-342900">
+              <a:spcBef>
+                <a:spcPts val="0"/>
+              </a:spcBef>
+              <a:buSzPts val="1800"/>
+              <a:buChar char="●"/>
+            </a:pPr>
+            <a:endParaRPr sz="1100" dirty="0"/>
+          </a:p>
+          <a:p>
+            <a:pPr marL="457200" lvl="0" indent="-342900" algn="l" rtl="0">
+              <a:spcBef>
+                <a:spcPts val="0"/>
+              </a:spcBef>
+              <a:spcAft>
+                <a:spcPts val="0"/>
+              </a:spcAft>
+              <a:buSzPts val="1800"/>
+              <a:buChar char="●"/>
+            </a:pPr>
+            <a:r>
+              <a:rPr lang="en" sz="1400" dirty="0"/>
+              <a:t>Challenges – orignal plan to show snippets of videos didn’t work due to lack of API documentation / we couldn’t get the API to work</a:t>
+            </a:r>
+          </a:p>
+          <a:p>
+            <a:pPr marL="114300" lvl="0" indent="0" algn="l" rtl="0">
+              <a:spcBef>
+                <a:spcPts val="0"/>
+              </a:spcBef>
+              <a:spcAft>
+                <a:spcPts val="0"/>
+              </a:spcAft>
+              <a:buSzPts val="1800"/>
+              <a:buNone/>
+            </a:pPr>
+            <a:endParaRPr sz="1400" dirty="0"/>
+          </a:p>
+          <a:p>
+            <a:pPr marL="457200" lvl="0" indent="-342900" algn="l" rtl="0">
+              <a:spcBef>
+                <a:spcPts val="0"/>
+              </a:spcBef>
+              <a:spcAft>
+                <a:spcPts val="0"/>
+              </a:spcAft>
+              <a:buSzPts val="1800"/>
+              <a:buChar char="●"/>
+            </a:pPr>
+            <a:r>
+              <a:rPr lang="en" sz="1400" dirty="0"/>
+              <a:t>Successes – utilized Bulma’s card functionality to quickly format data cards for each movie</a:t>
+            </a:r>
+            <a:endParaRPr sz="1400" dirty="0"/>
           </a:p>
         </p:txBody>
       </p:sp>

</xml_diff>